<commit_message>
Final outputs of project
</commit_message>
<xml_diff>
--- a/outputs/docs/Architecture_slide.pptx
+++ b/outputs/docs/Architecture_slide.pptx
@@ -104,7 +104,57 @@
       </a:defRPr>
     </a:lvl9pPr>
   </p:defaultTextStyle>
+  <p:extLst>
+    <p:ext uri="{EFAFB233-063F-42B5-8137-9DF3F51BA10A}">
+      <p15:sldGuideLst xmlns:p15="http://schemas.microsoft.com/office/powerpoint/2012/main"/>
+    </p:ext>
+  </p:extLst>
 </p:presentation>
+</file>
+
+<file path=ppt/changesInfos/changesInfo1.xml><?xml version="1.0" encoding="utf-8"?>
+<pc:chgInfo xmlns:a="http://schemas.openxmlformats.org/drawingml/2006/main" xmlns:r="http://schemas.openxmlformats.org/officeDocument/2006/relationships" xmlns:ac="http://schemas.microsoft.com/office/drawing/2013/main/command" xmlns:pc="http://schemas.microsoft.com/office/powerpoint/2013/main/command">
+  <pc:docChgLst>
+    <pc:chgData name="Koemen, Silas" userId="76de14de-3ac6-47d8-927a-4db41765fc10" providerId="ADAL" clId="{1546BE67-B6E6-9E48-A0E6-8F797F7270F7}"/>
+    <pc:docChg chg="modSld">
+      <pc:chgData name="Koemen, Silas" userId="76de14de-3ac6-47d8-927a-4db41765fc10" providerId="ADAL" clId="{1546BE67-B6E6-9E48-A0E6-8F797F7270F7}" dt="2024-08-28T10:25:58.265" v="13" actId="114"/>
+      <pc:docMkLst>
+        <pc:docMk/>
+      </pc:docMkLst>
+      <pc:sldChg chg="modSp mod">
+        <pc:chgData name="Koemen, Silas" userId="76de14de-3ac6-47d8-927a-4db41765fc10" providerId="ADAL" clId="{1546BE67-B6E6-9E48-A0E6-8F797F7270F7}" dt="2024-08-28T10:25:58.265" v="13" actId="114"/>
+        <pc:sldMkLst>
+          <pc:docMk/>
+          <pc:sldMk cId="3265334905" sldId="256"/>
+        </pc:sldMkLst>
+        <pc:spChg chg="mod">
+          <ac:chgData name="Koemen, Silas" userId="76de14de-3ac6-47d8-927a-4db41765fc10" providerId="ADAL" clId="{1546BE67-B6E6-9E48-A0E6-8F797F7270F7}" dt="2024-08-28T10:25:58.265" v="13" actId="114"/>
+          <ac:spMkLst>
+            <pc:docMk/>
+            <pc:sldMk cId="3265334905" sldId="256"/>
+            <ac:spMk id="4" creationId="{4BADBA5C-09A7-3B4C-BEAA-7A9687A59861}"/>
+          </ac:spMkLst>
+        </pc:spChg>
+        <pc:spChg chg="mod">
+          <ac:chgData name="Koemen, Silas" userId="76de14de-3ac6-47d8-927a-4db41765fc10" providerId="ADAL" clId="{1546BE67-B6E6-9E48-A0E6-8F797F7270F7}" dt="2024-08-28T10:25:51.180" v="9" actId="404"/>
+          <ac:spMkLst>
+            <pc:docMk/>
+            <pc:sldMk cId="3265334905" sldId="256"/>
+            <ac:spMk id="30" creationId="{5BFD44B6-82AA-E0AC-E223-90DAEEA4FC5E}"/>
+          </ac:spMkLst>
+        </pc:spChg>
+        <pc:spChg chg="mod">
+          <ac:chgData name="Koemen, Silas" userId="76de14de-3ac6-47d8-927a-4db41765fc10" providerId="ADAL" clId="{1546BE67-B6E6-9E48-A0E6-8F797F7270F7}" dt="2024-08-28T10:25:35.814" v="7" actId="114"/>
+          <ac:spMkLst>
+            <pc:docMk/>
+            <pc:sldMk cId="3265334905" sldId="256"/>
+            <ac:spMk id="31" creationId="{A8193993-AEC3-82ED-F940-10BB916B65F1}"/>
+          </ac:spMkLst>
+        </pc:spChg>
+      </pc:sldChg>
+    </pc:docChg>
+  </pc:docChgLst>
+</pc:chgInfo>
 </file>
 
 <file path=ppt/slideLayouts/slideLayout1.xml><?xml version="1.0" encoding="utf-8"?>
@@ -238,7 +288,7 @@
           <a:p>
             <a:fld id="{C8561188-BEC1-3449-B55E-DCA702E4C1BF}" type="datetimeFigureOut">
               <a:rPr lang="en-DE" smtClean="0"/>
-              <a:t>22.08.24</a:t>
+              <a:t>28.08.24</a:t>
             </a:fld>
             <a:endParaRPr lang="en-DE"/>
           </a:p>
@@ -408,7 +458,7 @@
           <a:p>
             <a:fld id="{C8561188-BEC1-3449-B55E-DCA702E4C1BF}" type="datetimeFigureOut">
               <a:rPr lang="en-DE" smtClean="0"/>
-              <a:t>22.08.24</a:t>
+              <a:t>28.08.24</a:t>
             </a:fld>
             <a:endParaRPr lang="en-DE"/>
           </a:p>
@@ -588,7 +638,7 @@
           <a:p>
             <a:fld id="{C8561188-BEC1-3449-B55E-DCA702E4C1BF}" type="datetimeFigureOut">
               <a:rPr lang="en-DE" smtClean="0"/>
-              <a:t>22.08.24</a:t>
+              <a:t>28.08.24</a:t>
             </a:fld>
             <a:endParaRPr lang="en-DE"/>
           </a:p>
@@ -758,7 +808,7 @@
           <a:p>
             <a:fld id="{C8561188-BEC1-3449-B55E-DCA702E4C1BF}" type="datetimeFigureOut">
               <a:rPr lang="en-DE" smtClean="0"/>
-              <a:t>22.08.24</a:t>
+              <a:t>28.08.24</a:t>
             </a:fld>
             <a:endParaRPr lang="en-DE"/>
           </a:p>
@@ -1004,7 +1054,7 @@
           <a:p>
             <a:fld id="{C8561188-BEC1-3449-B55E-DCA702E4C1BF}" type="datetimeFigureOut">
               <a:rPr lang="en-DE" smtClean="0"/>
-              <a:t>22.08.24</a:t>
+              <a:t>28.08.24</a:t>
             </a:fld>
             <a:endParaRPr lang="en-DE"/>
           </a:p>
@@ -1236,7 +1286,7 @@
           <a:p>
             <a:fld id="{C8561188-BEC1-3449-B55E-DCA702E4C1BF}" type="datetimeFigureOut">
               <a:rPr lang="en-DE" smtClean="0"/>
-              <a:t>22.08.24</a:t>
+              <a:t>28.08.24</a:t>
             </a:fld>
             <a:endParaRPr lang="en-DE"/>
           </a:p>
@@ -1603,7 +1653,7 @@
           <a:p>
             <a:fld id="{C8561188-BEC1-3449-B55E-DCA702E4C1BF}" type="datetimeFigureOut">
               <a:rPr lang="en-DE" smtClean="0"/>
-              <a:t>22.08.24</a:t>
+              <a:t>28.08.24</a:t>
             </a:fld>
             <a:endParaRPr lang="en-DE"/>
           </a:p>
@@ -1721,7 +1771,7 @@
           <a:p>
             <a:fld id="{C8561188-BEC1-3449-B55E-DCA702E4C1BF}" type="datetimeFigureOut">
               <a:rPr lang="en-DE" smtClean="0"/>
-              <a:t>22.08.24</a:t>
+              <a:t>28.08.24</a:t>
             </a:fld>
             <a:endParaRPr lang="en-DE"/>
           </a:p>
@@ -1816,7 +1866,7 @@
           <a:p>
             <a:fld id="{C8561188-BEC1-3449-B55E-DCA702E4C1BF}" type="datetimeFigureOut">
               <a:rPr lang="en-DE" smtClean="0"/>
-              <a:t>22.08.24</a:t>
+              <a:t>28.08.24</a:t>
             </a:fld>
             <a:endParaRPr lang="en-DE"/>
           </a:p>
@@ -2093,7 +2143,7 @@
           <a:p>
             <a:fld id="{C8561188-BEC1-3449-B55E-DCA702E4C1BF}" type="datetimeFigureOut">
               <a:rPr lang="en-DE" smtClean="0"/>
-              <a:t>22.08.24</a:t>
+              <a:t>28.08.24</a:t>
             </a:fld>
             <a:endParaRPr lang="en-DE"/>
           </a:p>
@@ -2350,7 +2400,7 @@
           <a:p>
             <a:fld id="{C8561188-BEC1-3449-B55E-DCA702E4C1BF}" type="datetimeFigureOut">
               <a:rPr lang="en-DE" smtClean="0"/>
-              <a:t>22.08.24</a:t>
+              <a:t>28.08.24</a:t>
             </a:fld>
             <a:endParaRPr lang="en-DE"/>
           </a:p>
@@ -2563,7 +2613,7 @@
           <a:p>
             <a:fld id="{C8561188-BEC1-3449-B55E-DCA702E4C1BF}" type="datetimeFigureOut">
               <a:rPr lang="en-DE" smtClean="0"/>
-              <a:t>22.08.24</a:t>
+              <a:t>28.08.24</a:t>
             </a:fld>
             <a:endParaRPr lang="en-DE"/>
           </a:p>
@@ -3013,10 +3063,17 @@
                 <a:latin typeface="Times New Roman" panose="02020603050405020304" pitchFamily="18" charset="0"/>
                 <a:cs typeface="Times New Roman" panose="02020603050405020304" pitchFamily="18" charset="0"/>
               </a:rPr>
-              <a:t>Input: X</a:t>
-            </a:r>
-            <a:r>
-              <a:rPr lang="en-DE" sz="2000" baseline="-25000" dirty="0">
+              <a:t>Input: </a:t>
+            </a:r>
+            <a:r>
+              <a:rPr lang="en-DE" sz="1801" i="1" dirty="0">
+                <a:latin typeface="Times New Roman" panose="02020603050405020304" pitchFamily="18" charset="0"/>
+                <a:cs typeface="Times New Roman" panose="02020603050405020304" pitchFamily="18" charset="0"/>
+              </a:rPr>
+              <a:t>X</a:t>
+            </a:r>
+            <a:r>
+              <a:rPr lang="en-DE" sz="2000" i="1" baseline="-25000" dirty="0">
                 <a:latin typeface="Times New Roman" panose="02020603050405020304" pitchFamily="18" charset="0"/>
                 <a:cs typeface="Times New Roman" panose="02020603050405020304" pitchFamily="18" charset="0"/>
               </a:rPr>
@@ -3029,6 +3086,17 @@
               </a:rPr>
               <a:t>, dow</a:t>
             </a:r>
+            <a:r>
+              <a:rPr lang="en-DE" sz="2000" i="1" baseline="-25000" dirty="0">
+                <a:latin typeface="Times New Roman" panose="02020603050405020304" pitchFamily="18" charset="0"/>
+                <a:cs typeface="Times New Roman" panose="02020603050405020304" pitchFamily="18" charset="0"/>
+              </a:rPr>
+              <a:t>t</a:t>
+            </a:r>
+            <a:endParaRPr lang="en-DE" sz="1801" i="1" baseline="-25000" dirty="0">
+              <a:latin typeface="Times New Roman" panose="02020603050405020304" pitchFamily="18" charset="0"/>
+              <a:cs typeface="Times New Roman" panose="02020603050405020304" pitchFamily="18" charset="0"/>
+            </a:endParaRPr>
           </a:p>
         </p:txBody>
       </p:sp>
@@ -3466,6 +3534,17 @@
               </a:rPr>
               <a:t>dow</a:t>
             </a:r>
+            <a:r>
+              <a:rPr lang="en-DE" sz="2000" i="1" baseline="-25000" dirty="0">
+                <a:latin typeface="Times New Roman" panose="02020603050405020304" pitchFamily="18" charset="0"/>
+                <a:cs typeface="Times New Roman" panose="02020603050405020304" pitchFamily="18" charset="0"/>
+              </a:rPr>
+              <a:t>t</a:t>
+            </a:r>
+            <a:endParaRPr lang="en-DE" sz="1801" i="1" baseline="-25000" dirty="0">
+              <a:latin typeface="Times New Roman" panose="02020603050405020304" pitchFamily="18" charset="0"/>
+              <a:cs typeface="Times New Roman" panose="02020603050405020304" pitchFamily="18" charset="0"/>
+            </a:endParaRPr>
           </a:p>
         </p:txBody>
       </p:sp>
@@ -3498,20 +3577,20 @@
           <a:lstStyle/>
           <a:p>
             <a:r>
-              <a:rPr lang="en-DE" sz="1801" dirty="0">
+              <a:rPr lang="en-DE" sz="1801" i="1" dirty="0">
                 <a:latin typeface="Times New Roman" panose="02020603050405020304" pitchFamily="18" charset="0"/>
                 <a:cs typeface="Times New Roman" panose="02020603050405020304" pitchFamily="18" charset="0"/>
               </a:rPr>
               <a:t>X</a:t>
             </a:r>
             <a:r>
-              <a:rPr lang="en-DE" sz="2000" baseline="-25000" dirty="0">
+              <a:rPr lang="en-DE" sz="2000" i="1" baseline="-25000" dirty="0">
                 <a:latin typeface="Times New Roman" panose="02020603050405020304" pitchFamily="18" charset="0"/>
                 <a:cs typeface="Times New Roman" panose="02020603050405020304" pitchFamily="18" charset="0"/>
               </a:rPr>
               <a:t>t</a:t>
             </a:r>
-            <a:endParaRPr lang="en-DE" sz="1801" dirty="0"/>
+            <a:endParaRPr lang="en-DE" sz="1801" i="1" dirty="0"/>
           </a:p>
         </p:txBody>
       </p:sp>

</xml_diff>